<commit_message>
update final version ppt
</commit_message>
<xml_diff>
--- a/20230327_Collision_Detection/Collision_Detection.pptx
+++ b/20230327_Collision_Detection/Collision_Detection.pptx
@@ -220,7 +220,7 @@
           <a:p>
             <a:fld id="{63FDC6A3-7C42-4479-866C-9B859DB0775B}" type="datetimeFigureOut">
               <a:rPr lang="zh-CN" altLang="en-US" smtClean="0"/>
-              <a:t>2023/3/26</a:t>
+              <a:t>2023/3/27</a:t>
             </a:fld>
             <a:endParaRPr lang="zh-CN" altLang="en-US"/>
           </a:p>
@@ -1810,7 +1810,7 @@
           <a:p>
             <a:fld id="{33791A2C-FC72-48B7-BD31-E3696B249E7F}" type="datetimeFigureOut">
               <a:rPr lang="zh-CN" altLang="en-US" smtClean="0"/>
-              <a:t>2023/3/26</a:t>
+              <a:t>2023/3/27</a:t>
             </a:fld>
             <a:endParaRPr lang="zh-CN" altLang="en-US"/>
           </a:p>
@@ -2008,7 +2008,7 @@
           <a:p>
             <a:fld id="{33791A2C-FC72-48B7-BD31-E3696B249E7F}" type="datetimeFigureOut">
               <a:rPr lang="zh-CN" altLang="en-US" smtClean="0"/>
-              <a:t>2023/3/26</a:t>
+              <a:t>2023/3/27</a:t>
             </a:fld>
             <a:endParaRPr lang="zh-CN" altLang="en-US"/>
           </a:p>
@@ -2216,7 +2216,7 @@
           <a:p>
             <a:fld id="{33791A2C-FC72-48B7-BD31-E3696B249E7F}" type="datetimeFigureOut">
               <a:rPr lang="zh-CN" altLang="en-US" smtClean="0"/>
-              <a:t>2023/3/26</a:t>
+              <a:t>2023/3/27</a:t>
             </a:fld>
             <a:endParaRPr lang="zh-CN" altLang="en-US"/>
           </a:p>
@@ -2414,7 +2414,7 @@
           <a:p>
             <a:fld id="{33791A2C-FC72-48B7-BD31-E3696B249E7F}" type="datetimeFigureOut">
               <a:rPr lang="zh-CN" altLang="en-US" smtClean="0"/>
-              <a:t>2023/3/26</a:t>
+              <a:t>2023/3/27</a:t>
             </a:fld>
             <a:endParaRPr lang="zh-CN" altLang="en-US"/>
           </a:p>
@@ -2689,7 +2689,7 @@
           <a:p>
             <a:fld id="{33791A2C-FC72-48B7-BD31-E3696B249E7F}" type="datetimeFigureOut">
               <a:rPr lang="zh-CN" altLang="en-US" smtClean="0"/>
-              <a:t>2023/3/26</a:t>
+              <a:t>2023/3/27</a:t>
             </a:fld>
             <a:endParaRPr lang="zh-CN" altLang="en-US"/>
           </a:p>
@@ -2954,7 +2954,7 @@
           <a:p>
             <a:fld id="{33791A2C-FC72-48B7-BD31-E3696B249E7F}" type="datetimeFigureOut">
               <a:rPr lang="zh-CN" altLang="en-US" smtClean="0"/>
-              <a:t>2023/3/26</a:t>
+              <a:t>2023/3/27</a:t>
             </a:fld>
             <a:endParaRPr lang="zh-CN" altLang="en-US"/>
           </a:p>
@@ -3366,7 +3366,7 @@
           <a:p>
             <a:fld id="{33791A2C-FC72-48B7-BD31-E3696B249E7F}" type="datetimeFigureOut">
               <a:rPr lang="zh-CN" altLang="en-US" smtClean="0"/>
-              <a:t>2023/3/26</a:t>
+              <a:t>2023/3/27</a:t>
             </a:fld>
             <a:endParaRPr lang="zh-CN" altLang="en-US"/>
           </a:p>
@@ -3507,7 +3507,7 @@
           <a:p>
             <a:fld id="{33791A2C-FC72-48B7-BD31-E3696B249E7F}" type="datetimeFigureOut">
               <a:rPr lang="zh-CN" altLang="en-US" smtClean="0"/>
-              <a:t>2023/3/26</a:t>
+              <a:t>2023/3/27</a:t>
             </a:fld>
             <a:endParaRPr lang="zh-CN" altLang="en-US"/>
           </a:p>
@@ -3620,7 +3620,7 @@
           <a:p>
             <a:fld id="{33791A2C-FC72-48B7-BD31-E3696B249E7F}" type="datetimeFigureOut">
               <a:rPr lang="zh-CN" altLang="en-US" smtClean="0"/>
-              <a:t>2023/3/26</a:t>
+              <a:t>2023/3/27</a:t>
             </a:fld>
             <a:endParaRPr lang="zh-CN" altLang="en-US"/>
           </a:p>
@@ -3931,7 +3931,7 @@
           <a:p>
             <a:fld id="{33791A2C-FC72-48B7-BD31-E3696B249E7F}" type="datetimeFigureOut">
               <a:rPr lang="zh-CN" altLang="en-US" smtClean="0"/>
-              <a:t>2023/3/26</a:t>
+              <a:t>2023/3/27</a:t>
             </a:fld>
             <a:endParaRPr lang="zh-CN" altLang="en-US"/>
           </a:p>
@@ -4219,7 +4219,7 @@
           <a:p>
             <a:fld id="{33791A2C-FC72-48B7-BD31-E3696B249E7F}" type="datetimeFigureOut">
               <a:rPr lang="zh-CN" altLang="en-US" smtClean="0"/>
-              <a:t>2023/3/26</a:t>
+              <a:t>2023/3/27</a:t>
             </a:fld>
             <a:endParaRPr lang="zh-CN" altLang="en-US"/>
           </a:p>
@@ -4460,7 +4460,7 @@
           <a:p>
             <a:fld id="{33791A2C-FC72-48B7-BD31-E3696B249E7F}" type="datetimeFigureOut">
               <a:rPr lang="zh-CN" altLang="en-US" smtClean="0"/>
-              <a:t>2023/3/26</a:t>
+              <a:t>2023/3/27</a:t>
             </a:fld>
             <a:endParaRPr lang="zh-CN" altLang="en-US"/>
           </a:p>
@@ -23404,13 +23404,13 @@
   <p:clrMapOvr>
     <a:masterClrMapping/>
   </p:clrMapOvr>
-  <mc:AlternateContent xmlns:mc="http://schemas.openxmlformats.org/markup-compatibility/2006">
-    <mc:Choice xmlns:p159="http://schemas.microsoft.com/office/powerpoint/2015/09/main" Requires="p159">
+  <mc:AlternateContent xmlns:mc="http://schemas.openxmlformats.org/markup-compatibility/2006" xmlns:p159="http://schemas.microsoft.com/office/powerpoint/2015/09/main">
+    <mc:Choice Requires="p159">
       <p:transition xmlns:p14="http://schemas.microsoft.com/office/powerpoint/2010/main" spd="slow" p14:dur="2000">
         <p159:morph option="byObject"/>
       </p:transition>
     </mc:Choice>
-    <mc:Fallback>
+    <mc:Fallback xmlns="">
       <p:transition spd="slow">
         <p:fade/>
       </p:transition>
@@ -24125,8 +24125,8 @@
           </a:p>
         </p:txBody>
       </p:sp>
-      <mc:AlternateContent xmlns:mc="http://schemas.openxmlformats.org/markup-compatibility/2006">
-        <mc:Choice xmlns:a14="http://schemas.microsoft.com/office/drawing/2010/main" Requires="a14">
+      <mc:AlternateContent xmlns:mc="http://schemas.openxmlformats.org/markup-compatibility/2006" xmlns:a14="http://schemas.microsoft.com/office/drawing/2010/main">
+        <mc:Choice Requires="a14">
           <p:sp>
             <p:nvSpPr>
               <p:cNvPr id="7" name="Title 1">
@@ -24227,7 +24227,7 @@
             </p:txBody>
           </p:sp>
         </mc:Choice>
-        <mc:Fallback>
+        <mc:Fallback xmlns="">
           <p:sp>
             <p:nvSpPr>
               <p:cNvPr id="7" name="Title 1">
@@ -24282,13 +24282,13 @@
   <p:clrMapOvr>
     <a:masterClrMapping/>
   </p:clrMapOvr>
-  <mc:AlternateContent xmlns:mc="http://schemas.openxmlformats.org/markup-compatibility/2006">
-    <mc:Choice xmlns:p159="http://schemas.microsoft.com/office/powerpoint/2015/09/main" Requires="p159">
+  <mc:AlternateContent xmlns:mc="http://schemas.openxmlformats.org/markup-compatibility/2006" xmlns:p159="http://schemas.microsoft.com/office/powerpoint/2015/09/main">
+    <mc:Choice Requires="p159">
       <p:transition xmlns:p14="http://schemas.microsoft.com/office/powerpoint/2010/main" spd="slow" p14:dur="2000">
         <p159:morph option="byObject"/>
       </p:transition>
     </mc:Choice>
-    <mc:Fallback>
+    <mc:Fallback xmlns="">
       <p:transition spd="slow">
         <p:fade/>
       </p:transition>
@@ -24445,13 +24445,13 @@
   <p:clrMapOvr>
     <a:masterClrMapping/>
   </p:clrMapOvr>
-  <mc:AlternateContent xmlns:mc="http://schemas.openxmlformats.org/markup-compatibility/2006">
-    <mc:Choice xmlns:p159="http://schemas.microsoft.com/office/powerpoint/2015/09/main" Requires="p159">
+  <mc:AlternateContent xmlns:mc="http://schemas.openxmlformats.org/markup-compatibility/2006" xmlns:p159="http://schemas.microsoft.com/office/powerpoint/2015/09/main">
+    <mc:Choice Requires="p159">
       <p:transition xmlns:p14="http://schemas.microsoft.com/office/powerpoint/2010/main" spd="slow" p14:dur="2000">
         <p159:morph option="byObject"/>
       </p:transition>
     </mc:Choice>
-    <mc:Fallback>
+    <mc:Fallback xmlns="">
       <p:transition spd="slow">
         <p:fade/>
       </p:transition>
@@ -25541,13 +25541,13 @@
   <p:clrMapOvr>
     <a:masterClrMapping/>
   </p:clrMapOvr>
-  <mc:AlternateContent xmlns:mc="http://schemas.openxmlformats.org/markup-compatibility/2006">
-    <mc:Choice xmlns:p159="http://schemas.microsoft.com/office/powerpoint/2015/09/main" Requires="p159">
+  <mc:AlternateContent xmlns:mc="http://schemas.openxmlformats.org/markup-compatibility/2006" xmlns:p159="http://schemas.microsoft.com/office/powerpoint/2015/09/main">
+    <mc:Choice Requires="p159">
       <p:transition xmlns:p14="http://schemas.microsoft.com/office/powerpoint/2010/main" spd="slow" p14:dur="2000">
         <p159:morph option="byObject"/>
       </p:transition>
     </mc:Choice>
-    <mc:Fallback>
+    <mc:Fallback xmlns="">
       <p:transition spd="slow">
         <p:fade/>
       </p:transition>
@@ -25828,7 +25828,7 @@
           <a:p>
             <a:r>
               <a:rPr lang="en-US" altLang="zh-CN" sz="2400" dirty="0"/>
-              <a:t>Finite Element Method, Part I [SIGGRAPH 2012 Course] [</a:t>
+              <a:t>GPU Gems 3: Chapter 32. Broad-Phase Collision Detection with CUDA [</a:t>
             </a:r>
             <a:r>
               <a:rPr lang="en-US" altLang="zh-CN" sz="2400" dirty="0">
@@ -25844,7 +25844,7 @@
           <a:p>
             <a:r>
               <a:rPr lang="en-US" altLang="zh-CN" sz="2400" dirty="0"/>
-              <a:t>Dynamic Deformables: Implementation and Production Practicalities [SIGGRAH 2020 Course] [</a:t>
+              <a:t>SIGGRAPH'22 Course: Contact and Friction Simulation for Computer Graphics [</a:t>
             </a:r>
             <a:r>
               <a:rPr lang="en-US" altLang="zh-CN" sz="2400" dirty="0">
@@ -25859,12 +25859,8 @@
           </a:p>
           <a:p>
             <a:r>
-              <a:rPr lang="en-US" altLang="zh-CN" sz="2400" dirty="0" err="1"/>
-              <a:t>TaichiCourse</a:t>
-            </a:r>
-            <a:r>
               <a:rPr lang="en-US" altLang="zh-CN" sz="2400" dirty="0"/>
-              <a:t> 01: Lecture 08 [</a:t>
+              <a:t>GAMES Course 103 – Lecture 9: Collision Handling[</a:t>
             </a:r>
             <a:r>
               <a:rPr lang="en-US" altLang="zh-CN" sz="2400" dirty="0">
@@ -25878,22 +25874,6 @@
             </a:r>
           </a:p>
           <a:p>
-            <a:r>
-              <a:rPr lang="en-US" altLang="zh-CN" sz="2400" dirty="0"/>
-              <a:t>GAMES Course 103 – Lecture 7: Other Constrained Methods and Linear Finite Element Method I [</a:t>
-            </a:r>
-            <a:r>
-              <a:rPr lang="en-US" altLang="zh-CN" sz="2400" dirty="0">
-                <a:hlinkClick r:id="rId6"/>
-              </a:rPr>
-              <a:t>Link</a:t>
-            </a:r>
-            <a:r>
-              <a:rPr lang="en-US" altLang="zh-CN" sz="2400" dirty="0"/>
-              <a:t>]</a:t>
-            </a:r>
-          </a:p>
-          <a:p>
             <a:endParaRPr lang="en-US" altLang="zh-CN" sz="2400" dirty="0"/>
           </a:p>
           <a:p>
@@ -25949,14 +25929,10 @@
               <a:buNone/>
             </a:pPr>
             <a:r>
-              <a:rPr lang="en-US" altLang="zh-CN" sz="1400" dirty="0"/>
-              <a:t> </a:t>
-            </a:r>
-            <a:r>
               <a:rPr lang="en-US" altLang="zh-CN" sz="1400" dirty="0">
-                <a:hlinkClick r:id="rId7"/>
+                <a:hlinkClick r:id="rId6"/>
               </a:rPr>
-              <a:t>https://github.com/LILKOTYO/Lab-Presentation/tree/master/20220725_Spatial_and_Temporal_Discretization</a:t>
+              <a:t> https://github.com/LILKOTYO/Lab-Presentation/tree/master/20230327_Collision_Detection</a:t>
             </a:r>
             <a:endParaRPr lang="en-US" altLang="zh-CN" sz="1400" dirty="0"/>
           </a:p>
@@ -32557,8 +32533,8 @@
           </a:p>
         </p:txBody>
       </p:sp>
-      <mc:AlternateContent xmlns:mc="http://schemas.openxmlformats.org/markup-compatibility/2006">
-        <mc:Choice xmlns:a14="http://schemas.microsoft.com/office/drawing/2010/main" Requires="a14">
+      <mc:AlternateContent xmlns:mc="http://schemas.openxmlformats.org/markup-compatibility/2006" xmlns:a14="http://schemas.microsoft.com/office/drawing/2010/main">
+        <mc:Choice Requires="a14">
           <p:sp>
             <p:nvSpPr>
               <p:cNvPr id="4" name="文本框 3">
@@ -32587,6 +32563,7 @@
               </a:bodyPr>
               <a:lstStyle/>
               <a:p>
+                <a:pPr/>
                 <a14:m>
                   <m:oMathPara xmlns:m="http://schemas.openxmlformats.org/officeDocument/2006/math">
                     <m:oMathParaPr>
@@ -32631,7 +32608,7 @@
             </p:txBody>
           </p:sp>
         </mc:Choice>
-        <mc:Fallback>
+        <mc:Fallback xmlns="">
           <p:sp>
             <p:nvSpPr>
               <p:cNvPr id="4" name="文本框 3">

</xml_diff>